<commit_message>
More work on SAP
</commit_message>
<xml_diff>
--- a/official/WCP52 Gain_Phase SAP.pptx
+++ b/official/WCP52 Gain_Phase SAP.pptx
@@ -5,7 +5,7 @@
     <p:sldMasterId id="2147483654" r:id="rId1"/>
   </p:sldMasterIdLst>
   <p:notesMasterIdLst>
-    <p:notesMasterId r:id="rId11"/>
+    <p:notesMasterId r:id="rId14"/>
   </p:notesMasterIdLst>
   <p:sldIdLst>
     <p:sldId id="256" r:id="rId2"/>
@@ -14,9 +14,12 @@
     <p:sldId id="259" r:id="rId5"/>
     <p:sldId id="260" r:id="rId6"/>
     <p:sldId id="264" r:id="rId7"/>
-    <p:sldId id="261" r:id="rId8"/>
-    <p:sldId id="262" r:id="rId9"/>
-    <p:sldId id="263" r:id="rId10"/>
+    <p:sldId id="266" r:id="rId8"/>
+    <p:sldId id="265" r:id="rId9"/>
+    <p:sldId id="267" r:id="rId10"/>
+    <p:sldId id="261" r:id="rId11"/>
+    <p:sldId id="262" r:id="rId12"/>
+    <p:sldId id="263" r:id="rId13"/>
   </p:sldIdLst>
   <p:sldSz cx="9144000" cy="5143500" type="screen16x9"/>
   <p:notesSz cx="6858000" cy="9144000"/>
@@ -628,12 +631,12 @@
 </p:notes>
 </file>
 
-<file path=ppt/notesSlides/notesSlide2.xml><?xml version="1.0" encoding="utf-8"?>
+<file path=ppt/notesSlides/notesSlide10.xml><?xml version="1.0" encoding="utf-8"?>
 <p:notes xmlns:a="http://schemas.openxmlformats.org/drawingml/2006/main" xmlns:r="http://schemas.openxmlformats.org/officeDocument/2006/relationships" xmlns:p="http://schemas.openxmlformats.org/presentationml/2006/main" showMasterSp="0" showMasterPhAnim="0">
   <p:cSld>
     <p:spTree>
       <p:nvGrpSpPr>
-        <p:cNvPr id="1" name="Shape 50"/>
+        <p:cNvPr id="1" name="Shape 76"/>
         <p:cNvGrpSpPr/>
         <p:nvPr/>
       </p:nvGrpSpPr>
@@ -647,7 +650,7 @@
       </p:grpSpPr>
       <p:sp>
         <p:nvSpPr>
-          <p:cNvPr id="51" name="Shape 51"/>
+          <p:cNvPr id="77" name="Shape 77"/>
           <p:cNvSpPr>
             <a:spLocks noGrp="1" noRot="1" noChangeAspect="1"/>
           </p:cNvSpPr>
@@ -698,7 +701,7 @@
       </p:sp>
       <p:sp>
         <p:nvSpPr>
-          <p:cNvPr id="52" name="Shape 52"/>
+          <p:cNvPr id="78" name="Shape 78"/>
           <p:cNvSpPr txBox="1">
             <a:spLocks noGrp="1"/>
           </p:cNvSpPr>
@@ -734,7 +737,7 @@
     </p:spTree>
     <p:extLst>
       <p:ext uri="{BB962C8B-B14F-4D97-AF65-F5344CB8AC3E}">
-        <p14:creationId xmlns:p14="http://schemas.microsoft.com/office/powerpoint/2010/main" val="362572113"/>
+        <p14:creationId xmlns:p14="http://schemas.microsoft.com/office/powerpoint/2010/main" val="1065350891"/>
       </p:ext>
     </p:extLst>
   </p:cSld>
@@ -744,12 +747,12 @@
 </p:notes>
 </file>
 
-<file path=ppt/notesSlides/notesSlide3.xml><?xml version="1.0" encoding="utf-8"?>
+<file path=ppt/notesSlides/notesSlide11.xml><?xml version="1.0" encoding="utf-8"?>
 <p:notes xmlns:a="http://schemas.openxmlformats.org/drawingml/2006/main" xmlns:r="http://schemas.openxmlformats.org/officeDocument/2006/relationships" xmlns:p="http://schemas.openxmlformats.org/presentationml/2006/main" showMasterSp="0" showMasterPhAnim="0">
   <p:cSld>
     <p:spTree>
       <p:nvGrpSpPr>
-        <p:cNvPr id="1" name="Shape 56"/>
+        <p:cNvPr id="1" name="Shape 83"/>
         <p:cNvGrpSpPr/>
         <p:nvPr/>
       </p:nvGrpSpPr>
@@ -763,7 +766,7 @@
       </p:grpSpPr>
       <p:sp>
         <p:nvSpPr>
-          <p:cNvPr id="57" name="Shape 57"/>
+          <p:cNvPr id="84" name="Shape 84"/>
           <p:cNvSpPr>
             <a:spLocks noGrp="1" noRot="1" noChangeAspect="1"/>
           </p:cNvSpPr>
@@ -814,7 +817,7 @@
       </p:sp>
       <p:sp>
         <p:nvSpPr>
-          <p:cNvPr id="58" name="Shape 58"/>
+          <p:cNvPr id="85" name="Shape 85"/>
           <p:cNvSpPr txBox="1">
             <a:spLocks noGrp="1"/>
           </p:cNvSpPr>
@@ -850,7 +853,7 @@
     </p:spTree>
     <p:extLst>
       <p:ext uri="{BB962C8B-B14F-4D97-AF65-F5344CB8AC3E}">
-        <p14:creationId xmlns:p14="http://schemas.microsoft.com/office/powerpoint/2010/main" val="1314618205"/>
+        <p14:creationId xmlns:p14="http://schemas.microsoft.com/office/powerpoint/2010/main" val="19782095"/>
       </p:ext>
     </p:extLst>
   </p:cSld>
@@ -860,12 +863,12 @@
 </p:notes>
 </file>
 
-<file path=ppt/notesSlides/notesSlide4.xml><?xml version="1.0" encoding="utf-8"?>
+<file path=ppt/notesSlides/notesSlide12.xml><?xml version="1.0" encoding="utf-8"?>
 <p:notes xmlns:a="http://schemas.openxmlformats.org/drawingml/2006/main" xmlns:r="http://schemas.openxmlformats.org/officeDocument/2006/relationships" xmlns:p="http://schemas.openxmlformats.org/presentationml/2006/main" showMasterSp="0" showMasterPhAnim="0">
   <p:cSld>
     <p:spTree>
       <p:nvGrpSpPr>
-        <p:cNvPr id="1" name="Shape 63"/>
+        <p:cNvPr id="1" name="Shape 89"/>
         <p:cNvGrpSpPr/>
         <p:nvPr/>
       </p:nvGrpSpPr>
@@ -879,7 +882,7 @@
       </p:grpSpPr>
       <p:sp>
         <p:nvSpPr>
-          <p:cNvPr id="64" name="Shape 64"/>
+          <p:cNvPr id="90" name="Shape 90"/>
           <p:cNvSpPr>
             <a:spLocks noGrp="1" noRot="1" noChangeAspect="1"/>
           </p:cNvSpPr>
@@ -930,7 +933,7 @@
       </p:sp>
       <p:sp>
         <p:nvSpPr>
-          <p:cNvPr id="65" name="Shape 65"/>
+          <p:cNvPr id="91" name="Shape 91"/>
           <p:cNvSpPr txBox="1">
             <a:spLocks noGrp="1"/>
           </p:cNvSpPr>
@@ -966,7 +969,7 @@
     </p:spTree>
     <p:extLst>
       <p:ext uri="{BB962C8B-B14F-4D97-AF65-F5344CB8AC3E}">
-        <p14:creationId xmlns:p14="http://schemas.microsoft.com/office/powerpoint/2010/main" val="1059920176"/>
+        <p14:creationId xmlns:p14="http://schemas.microsoft.com/office/powerpoint/2010/main" val="1495971354"/>
       </p:ext>
     </p:extLst>
   </p:cSld>
@@ -976,12 +979,12 @@
 </p:notes>
 </file>
 
-<file path=ppt/notesSlides/notesSlide5.xml><?xml version="1.0" encoding="utf-8"?>
+<file path=ppt/notesSlides/notesSlide2.xml><?xml version="1.0" encoding="utf-8"?>
 <p:notes xmlns:a="http://schemas.openxmlformats.org/drawingml/2006/main" xmlns:r="http://schemas.openxmlformats.org/officeDocument/2006/relationships" xmlns:p="http://schemas.openxmlformats.org/presentationml/2006/main" showMasterSp="0" showMasterPhAnim="0">
   <p:cSld>
     <p:spTree>
       <p:nvGrpSpPr>
-        <p:cNvPr id="1" name="Shape 70"/>
+        <p:cNvPr id="1" name="Shape 50"/>
         <p:cNvGrpSpPr/>
         <p:nvPr/>
       </p:nvGrpSpPr>
@@ -995,7 +998,7 @@
       </p:grpSpPr>
       <p:sp>
         <p:nvSpPr>
-          <p:cNvPr id="71" name="Shape 71"/>
+          <p:cNvPr id="51" name="Shape 51"/>
           <p:cNvSpPr>
             <a:spLocks noGrp="1" noRot="1" noChangeAspect="1"/>
           </p:cNvSpPr>
@@ -1046,7 +1049,7 @@
       </p:sp>
       <p:sp>
         <p:nvSpPr>
-          <p:cNvPr id="72" name="Shape 72"/>
+          <p:cNvPr id="52" name="Shape 52"/>
           <p:cNvSpPr txBox="1">
             <a:spLocks noGrp="1"/>
           </p:cNvSpPr>
@@ -1082,7 +1085,7 @@
     </p:spTree>
     <p:extLst>
       <p:ext uri="{BB962C8B-B14F-4D97-AF65-F5344CB8AC3E}">
-        <p14:creationId xmlns:p14="http://schemas.microsoft.com/office/powerpoint/2010/main" val="4141766271"/>
+        <p14:creationId xmlns:p14="http://schemas.microsoft.com/office/powerpoint/2010/main" val="362572113"/>
       </p:ext>
     </p:extLst>
   </p:cSld>
@@ -1092,7 +1095,7 @@
 </p:notes>
 </file>
 
-<file path=ppt/notesSlides/notesSlide6.xml><?xml version="1.0" encoding="utf-8"?>
+<file path=ppt/notesSlides/notesSlide3.xml><?xml version="1.0" encoding="utf-8"?>
 <p:notes xmlns:a="http://schemas.openxmlformats.org/drawingml/2006/main" xmlns:r="http://schemas.openxmlformats.org/officeDocument/2006/relationships" xmlns:p="http://schemas.openxmlformats.org/presentationml/2006/main" showMasterSp="0" showMasterPhAnim="0">
   <p:cSld>
     <p:spTree>
@@ -1198,7 +1201,7 @@
     </p:spTree>
     <p:extLst>
       <p:ext uri="{BB962C8B-B14F-4D97-AF65-F5344CB8AC3E}">
-        <p14:creationId xmlns:p14="http://schemas.microsoft.com/office/powerpoint/2010/main" val="432060114"/>
+        <p14:creationId xmlns:p14="http://schemas.microsoft.com/office/powerpoint/2010/main" val="1314618205"/>
       </p:ext>
     </p:extLst>
   </p:cSld>
@@ -1208,12 +1211,12 @@
 </p:notes>
 </file>
 
-<file path=ppt/notesSlides/notesSlide7.xml><?xml version="1.0" encoding="utf-8"?>
+<file path=ppt/notesSlides/notesSlide4.xml><?xml version="1.0" encoding="utf-8"?>
 <p:notes xmlns:a="http://schemas.openxmlformats.org/drawingml/2006/main" xmlns:r="http://schemas.openxmlformats.org/officeDocument/2006/relationships" xmlns:p="http://schemas.openxmlformats.org/presentationml/2006/main" showMasterSp="0" showMasterPhAnim="0">
   <p:cSld>
     <p:spTree>
       <p:nvGrpSpPr>
-        <p:cNvPr id="1" name="Shape 76"/>
+        <p:cNvPr id="1" name="Shape 63"/>
         <p:cNvGrpSpPr/>
         <p:nvPr/>
       </p:nvGrpSpPr>
@@ -1227,7 +1230,7 @@
       </p:grpSpPr>
       <p:sp>
         <p:nvSpPr>
-          <p:cNvPr id="77" name="Shape 77"/>
+          <p:cNvPr id="64" name="Shape 64"/>
           <p:cNvSpPr>
             <a:spLocks noGrp="1" noRot="1" noChangeAspect="1"/>
           </p:cNvSpPr>
@@ -1278,7 +1281,7 @@
       </p:sp>
       <p:sp>
         <p:nvSpPr>
-          <p:cNvPr id="78" name="Shape 78"/>
+          <p:cNvPr id="65" name="Shape 65"/>
           <p:cNvSpPr txBox="1">
             <a:spLocks noGrp="1"/>
           </p:cNvSpPr>
@@ -1314,7 +1317,7 @@
     </p:spTree>
     <p:extLst>
       <p:ext uri="{BB962C8B-B14F-4D97-AF65-F5344CB8AC3E}">
-        <p14:creationId xmlns:p14="http://schemas.microsoft.com/office/powerpoint/2010/main" val="1065350891"/>
+        <p14:creationId xmlns:p14="http://schemas.microsoft.com/office/powerpoint/2010/main" val="1059920176"/>
       </p:ext>
     </p:extLst>
   </p:cSld>
@@ -1324,12 +1327,12 @@
 </p:notes>
 </file>
 
-<file path=ppt/notesSlides/notesSlide8.xml><?xml version="1.0" encoding="utf-8"?>
+<file path=ppt/notesSlides/notesSlide5.xml><?xml version="1.0" encoding="utf-8"?>
 <p:notes xmlns:a="http://schemas.openxmlformats.org/drawingml/2006/main" xmlns:r="http://schemas.openxmlformats.org/officeDocument/2006/relationships" xmlns:p="http://schemas.openxmlformats.org/presentationml/2006/main" showMasterSp="0" showMasterPhAnim="0">
   <p:cSld>
     <p:spTree>
       <p:nvGrpSpPr>
-        <p:cNvPr id="1" name="Shape 83"/>
+        <p:cNvPr id="1" name="Shape 70"/>
         <p:cNvGrpSpPr/>
         <p:nvPr/>
       </p:nvGrpSpPr>
@@ -1343,7 +1346,7 @@
       </p:grpSpPr>
       <p:sp>
         <p:nvSpPr>
-          <p:cNvPr id="84" name="Shape 84"/>
+          <p:cNvPr id="71" name="Shape 71"/>
           <p:cNvSpPr>
             <a:spLocks noGrp="1" noRot="1" noChangeAspect="1"/>
           </p:cNvSpPr>
@@ -1394,7 +1397,7 @@
       </p:sp>
       <p:sp>
         <p:nvSpPr>
-          <p:cNvPr id="85" name="Shape 85"/>
+          <p:cNvPr id="72" name="Shape 72"/>
           <p:cNvSpPr txBox="1">
             <a:spLocks noGrp="1"/>
           </p:cNvSpPr>
@@ -1430,7 +1433,7 @@
     </p:spTree>
     <p:extLst>
       <p:ext uri="{BB962C8B-B14F-4D97-AF65-F5344CB8AC3E}">
-        <p14:creationId xmlns:p14="http://schemas.microsoft.com/office/powerpoint/2010/main" val="19782095"/>
+        <p14:creationId xmlns:p14="http://schemas.microsoft.com/office/powerpoint/2010/main" val="4141766271"/>
       </p:ext>
     </p:extLst>
   </p:cSld>
@@ -1440,12 +1443,12 @@
 </p:notes>
 </file>
 
-<file path=ppt/notesSlides/notesSlide9.xml><?xml version="1.0" encoding="utf-8"?>
+<file path=ppt/notesSlides/notesSlide6.xml><?xml version="1.0" encoding="utf-8"?>
 <p:notes xmlns:a="http://schemas.openxmlformats.org/drawingml/2006/main" xmlns:r="http://schemas.openxmlformats.org/officeDocument/2006/relationships" xmlns:p="http://schemas.openxmlformats.org/presentationml/2006/main" showMasterSp="0" showMasterPhAnim="0">
   <p:cSld>
     <p:spTree>
       <p:nvGrpSpPr>
-        <p:cNvPr id="1" name="Shape 89"/>
+        <p:cNvPr id="1" name="Shape 56"/>
         <p:cNvGrpSpPr/>
         <p:nvPr/>
       </p:nvGrpSpPr>
@@ -1459,7 +1462,7 @@
       </p:grpSpPr>
       <p:sp>
         <p:nvSpPr>
-          <p:cNvPr id="90" name="Shape 90"/>
+          <p:cNvPr id="57" name="Shape 57"/>
           <p:cNvSpPr>
             <a:spLocks noGrp="1" noRot="1" noChangeAspect="1"/>
           </p:cNvSpPr>
@@ -1510,7 +1513,7 @@
       </p:sp>
       <p:sp>
         <p:nvSpPr>
-          <p:cNvPr id="91" name="Shape 91"/>
+          <p:cNvPr id="58" name="Shape 58"/>
           <p:cNvSpPr txBox="1">
             <a:spLocks noGrp="1"/>
           </p:cNvSpPr>
@@ -1546,7 +1549,355 @@
     </p:spTree>
     <p:extLst>
       <p:ext uri="{BB962C8B-B14F-4D97-AF65-F5344CB8AC3E}">
-        <p14:creationId xmlns:p14="http://schemas.microsoft.com/office/powerpoint/2010/main" val="1495971354"/>
+        <p14:creationId xmlns:p14="http://schemas.microsoft.com/office/powerpoint/2010/main" val="432060114"/>
+      </p:ext>
+    </p:extLst>
+  </p:cSld>
+  <p:clrMapOvr>
+    <a:masterClrMapping/>
+  </p:clrMapOvr>
+</p:notes>
+</file>
+
+<file path=ppt/notesSlides/notesSlide7.xml><?xml version="1.0" encoding="utf-8"?>
+<p:notes xmlns:a="http://schemas.openxmlformats.org/drawingml/2006/main" xmlns:r="http://schemas.openxmlformats.org/officeDocument/2006/relationships" xmlns:p="http://schemas.openxmlformats.org/presentationml/2006/main" showMasterSp="0" showMasterPhAnim="0">
+  <p:cSld>
+    <p:spTree>
+      <p:nvGrpSpPr>
+        <p:cNvPr id="1" name="Shape 56"/>
+        <p:cNvGrpSpPr/>
+        <p:nvPr/>
+      </p:nvGrpSpPr>
+      <p:grpSpPr>
+        <a:xfrm>
+          <a:off x="0" y="0"/>
+          <a:ext cx="0" cy="0"/>
+          <a:chOff x="0" y="0"/>
+          <a:chExt cx="0" cy="0"/>
+        </a:xfrm>
+      </p:grpSpPr>
+      <p:sp>
+        <p:nvSpPr>
+          <p:cNvPr id="57" name="Shape 57"/>
+          <p:cNvSpPr>
+            <a:spLocks noGrp="1" noRot="1" noChangeAspect="1"/>
+          </p:cNvSpPr>
+          <p:nvPr>
+            <p:ph type="sldImg" idx="2"/>
+          </p:nvPr>
+        </p:nvSpPr>
+        <p:spPr>
+          <a:xfrm>
+            <a:off x="381000" y="685800"/>
+            <a:ext cx="6096000" cy="3429000"/>
+          </a:xfrm>
+          <a:custGeom>
+            <a:avLst/>
+            <a:gdLst/>
+            <a:ahLst/>
+            <a:cxnLst/>
+            <a:rect l="0" t="0" r="0" b="0"/>
+            <a:pathLst>
+              <a:path w="120000" h="120000" extrusionOk="0">
+                <a:moveTo>
+                  <a:pt x="0" y="0"/>
+                </a:moveTo>
+                <a:lnTo>
+                  <a:pt x="120000" y="0"/>
+                </a:lnTo>
+                <a:lnTo>
+                  <a:pt x="120000" y="120000"/>
+                </a:lnTo>
+                <a:lnTo>
+                  <a:pt x="0" y="120000"/>
+                </a:lnTo>
+                <a:close/>
+              </a:path>
+            </a:pathLst>
+          </a:custGeom>
+          <a:noFill/>
+          <a:ln w="9525" cap="flat">
+            <a:solidFill>
+              <a:srgbClr val="000000"/>
+            </a:solidFill>
+            <a:prstDash val="solid"/>
+            <a:round/>
+            <a:headEnd type="none" w="med" len="med"/>
+            <a:tailEnd type="none" w="med" len="med"/>
+          </a:ln>
+        </p:spPr>
+      </p:sp>
+      <p:sp>
+        <p:nvSpPr>
+          <p:cNvPr id="58" name="Shape 58"/>
+          <p:cNvSpPr txBox="1">
+            <a:spLocks noGrp="1"/>
+          </p:cNvSpPr>
+          <p:nvPr>
+            <p:ph type="body" idx="1"/>
+          </p:nvPr>
+        </p:nvSpPr>
+        <p:spPr>
+          <a:xfrm>
+            <a:off x="685800" y="4343400"/>
+            <a:ext cx="5486399" cy="4114800"/>
+          </a:xfrm>
+          <a:prstGeom prst="rect">
+            <a:avLst/>
+          </a:prstGeom>
+        </p:spPr>
+        <p:txBody>
+          <a:bodyPr lIns="91425" tIns="91425" rIns="91425" bIns="91425" anchor="t" anchorCtr="0">
+            <a:noAutofit/>
+          </a:bodyPr>
+          <a:lstStyle/>
+          <a:p>
+            <a:pPr>
+              <a:spcBef>
+                <a:spcPts val="0"/>
+              </a:spcBef>
+              <a:buNone/>
+            </a:pPr>
+            <a:endParaRPr/>
+          </a:p>
+        </p:txBody>
+      </p:sp>
+    </p:spTree>
+    <p:extLst>
+      <p:ext uri="{BB962C8B-B14F-4D97-AF65-F5344CB8AC3E}">
+        <p14:creationId xmlns:p14="http://schemas.microsoft.com/office/powerpoint/2010/main" val="2972306871"/>
+      </p:ext>
+    </p:extLst>
+  </p:cSld>
+  <p:clrMapOvr>
+    <a:masterClrMapping/>
+  </p:clrMapOvr>
+</p:notes>
+</file>
+
+<file path=ppt/notesSlides/notesSlide8.xml><?xml version="1.0" encoding="utf-8"?>
+<p:notes xmlns:a="http://schemas.openxmlformats.org/drawingml/2006/main" xmlns:r="http://schemas.openxmlformats.org/officeDocument/2006/relationships" xmlns:p="http://schemas.openxmlformats.org/presentationml/2006/main" showMasterSp="0" showMasterPhAnim="0">
+  <p:cSld>
+    <p:spTree>
+      <p:nvGrpSpPr>
+        <p:cNvPr id="1" name="Shape 56"/>
+        <p:cNvGrpSpPr/>
+        <p:nvPr/>
+      </p:nvGrpSpPr>
+      <p:grpSpPr>
+        <a:xfrm>
+          <a:off x="0" y="0"/>
+          <a:ext cx="0" cy="0"/>
+          <a:chOff x="0" y="0"/>
+          <a:chExt cx="0" cy="0"/>
+        </a:xfrm>
+      </p:grpSpPr>
+      <p:sp>
+        <p:nvSpPr>
+          <p:cNvPr id="57" name="Shape 57"/>
+          <p:cNvSpPr>
+            <a:spLocks noGrp="1" noRot="1" noChangeAspect="1"/>
+          </p:cNvSpPr>
+          <p:nvPr>
+            <p:ph type="sldImg" idx="2"/>
+          </p:nvPr>
+        </p:nvSpPr>
+        <p:spPr>
+          <a:xfrm>
+            <a:off x="381000" y="685800"/>
+            <a:ext cx="6096000" cy="3429000"/>
+          </a:xfrm>
+          <a:custGeom>
+            <a:avLst/>
+            <a:gdLst/>
+            <a:ahLst/>
+            <a:cxnLst/>
+            <a:rect l="0" t="0" r="0" b="0"/>
+            <a:pathLst>
+              <a:path w="120000" h="120000" extrusionOk="0">
+                <a:moveTo>
+                  <a:pt x="0" y="0"/>
+                </a:moveTo>
+                <a:lnTo>
+                  <a:pt x="120000" y="0"/>
+                </a:lnTo>
+                <a:lnTo>
+                  <a:pt x="120000" y="120000"/>
+                </a:lnTo>
+                <a:lnTo>
+                  <a:pt x="0" y="120000"/>
+                </a:lnTo>
+                <a:close/>
+              </a:path>
+            </a:pathLst>
+          </a:custGeom>
+          <a:noFill/>
+          <a:ln w="9525" cap="flat">
+            <a:solidFill>
+              <a:srgbClr val="000000"/>
+            </a:solidFill>
+            <a:prstDash val="solid"/>
+            <a:round/>
+            <a:headEnd type="none" w="med" len="med"/>
+            <a:tailEnd type="none" w="med" len="med"/>
+          </a:ln>
+        </p:spPr>
+      </p:sp>
+      <p:sp>
+        <p:nvSpPr>
+          <p:cNvPr id="58" name="Shape 58"/>
+          <p:cNvSpPr txBox="1">
+            <a:spLocks noGrp="1"/>
+          </p:cNvSpPr>
+          <p:nvPr>
+            <p:ph type="body" idx="1"/>
+          </p:nvPr>
+        </p:nvSpPr>
+        <p:spPr>
+          <a:xfrm>
+            <a:off x="685800" y="4343400"/>
+            <a:ext cx="5486399" cy="4114800"/>
+          </a:xfrm>
+          <a:prstGeom prst="rect">
+            <a:avLst/>
+          </a:prstGeom>
+        </p:spPr>
+        <p:txBody>
+          <a:bodyPr lIns="91425" tIns="91425" rIns="91425" bIns="91425" anchor="t" anchorCtr="0">
+            <a:noAutofit/>
+          </a:bodyPr>
+          <a:lstStyle/>
+          <a:p>
+            <a:pPr>
+              <a:spcBef>
+                <a:spcPts val="0"/>
+              </a:spcBef>
+              <a:buNone/>
+            </a:pPr>
+            <a:endParaRPr/>
+          </a:p>
+        </p:txBody>
+      </p:sp>
+    </p:spTree>
+    <p:extLst>
+      <p:ext uri="{BB962C8B-B14F-4D97-AF65-F5344CB8AC3E}">
+        <p14:creationId xmlns:p14="http://schemas.microsoft.com/office/powerpoint/2010/main" val="208992683"/>
+      </p:ext>
+    </p:extLst>
+  </p:cSld>
+  <p:clrMapOvr>
+    <a:masterClrMapping/>
+  </p:clrMapOvr>
+</p:notes>
+</file>
+
+<file path=ppt/notesSlides/notesSlide9.xml><?xml version="1.0" encoding="utf-8"?>
+<p:notes xmlns:a="http://schemas.openxmlformats.org/drawingml/2006/main" xmlns:r="http://schemas.openxmlformats.org/officeDocument/2006/relationships" xmlns:p="http://schemas.openxmlformats.org/presentationml/2006/main" showMasterSp="0" showMasterPhAnim="0">
+  <p:cSld>
+    <p:spTree>
+      <p:nvGrpSpPr>
+        <p:cNvPr id="1" name="Shape 56"/>
+        <p:cNvGrpSpPr/>
+        <p:nvPr/>
+      </p:nvGrpSpPr>
+      <p:grpSpPr>
+        <a:xfrm>
+          <a:off x="0" y="0"/>
+          <a:ext cx="0" cy="0"/>
+          <a:chOff x="0" y="0"/>
+          <a:chExt cx="0" cy="0"/>
+        </a:xfrm>
+      </p:grpSpPr>
+      <p:sp>
+        <p:nvSpPr>
+          <p:cNvPr id="57" name="Shape 57"/>
+          <p:cNvSpPr>
+            <a:spLocks noGrp="1" noRot="1" noChangeAspect="1"/>
+          </p:cNvSpPr>
+          <p:nvPr>
+            <p:ph type="sldImg" idx="2"/>
+          </p:nvPr>
+        </p:nvSpPr>
+        <p:spPr>
+          <a:xfrm>
+            <a:off x="381000" y="685800"/>
+            <a:ext cx="6096000" cy="3429000"/>
+          </a:xfrm>
+          <a:custGeom>
+            <a:avLst/>
+            <a:gdLst/>
+            <a:ahLst/>
+            <a:cxnLst/>
+            <a:rect l="0" t="0" r="0" b="0"/>
+            <a:pathLst>
+              <a:path w="120000" h="120000" extrusionOk="0">
+                <a:moveTo>
+                  <a:pt x="0" y="0"/>
+                </a:moveTo>
+                <a:lnTo>
+                  <a:pt x="120000" y="0"/>
+                </a:lnTo>
+                <a:lnTo>
+                  <a:pt x="120000" y="120000"/>
+                </a:lnTo>
+                <a:lnTo>
+                  <a:pt x="0" y="120000"/>
+                </a:lnTo>
+                <a:close/>
+              </a:path>
+            </a:pathLst>
+          </a:custGeom>
+          <a:noFill/>
+          <a:ln w="9525" cap="flat">
+            <a:solidFill>
+              <a:srgbClr val="000000"/>
+            </a:solidFill>
+            <a:prstDash val="solid"/>
+            <a:round/>
+            <a:headEnd type="none" w="med" len="med"/>
+            <a:tailEnd type="none" w="med" len="med"/>
+          </a:ln>
+        </p:spPr>
+      </p:sp>
+      <p:sp>
+        <p:nvSpPr>
+          <p:cNvPr id="58" name="Shape 58"/>
+          <p:cNvSpPr txBox="1">
+            <a:spLocks noGrp="1"/>
+          </p:cNvSpPr>
+          <p:nvPr>
+            <p:ph type="body" idx="1"/>
+          </p:nvPr>
+        </p:nvSpPr>
+        <p:spPr>
+          <a:xfrm>
+            <a:off x="685800" y="4343400"/>
+            <a:ext cx="5486399" cy="4114800"/>
+          </a:xfrm>
+          <a:prstGeom prst="rect">
+            <a:avLst/>
+          </a:prstGeom>
+        </p:spPr>
+        <p:txBody>
+          <a:bodyPr lIns="91425" tIns="91425" rIns="91425" bIns="91425" anchor="t" anchorCtr="0">
+            <a:noAutofit/>
+          </a:bodyPr>
+          <a:lstStyle/>
+          <a:p>
+            <a:pPr>
+              <a:spcBef>
+                <a:spcPts val="0"/>
+              </a:spcBef>
+              <a:buNone/>
+            </a:pPr>
+            <a:endParaRPr/>
+          </a:p>
+        </p:txBody>
+      </p:sp>
+    </p:spTree>
+    <p:extLst>
+      <p:ext uri="{BB962C8B-B14F-4D97-AF65-F5344CB8AC3E}">
+        <p14:creationId xmlns:p14="http://schemas.microsoft.com/office/powerpoint/2010/main" val="2957237518"/>
       </p:ext>
     </p:extLst>
   </p:cSld>
@@ -5485,6 +5836,575 @@
 </p:sld>
 </file>
 
+<file path=ppt/slides/slide10.xml><?xml version="1.0" encoding="utf-8"?>
+<p:sld xmlns:a="http://schemas.openxmlformats.org/drawingml/2006/main" xmlns:r="http://schemas.openxmlformats.org/officeDocument/2006/relationships" xmlns:p="http://schemas.openxmlformats.org/presentationml/2006/main">
+  <p:cSld>
+    <p:spTree>
+      <p:nvGrpSpPr>
+        <p:cNvPr id="1" name="Shape 73"/>
+        <p:cNvGrpSpPr/>
+        <p:nvPr/>
+      </p:nvGrpSpPr>
+      <p:grpSpPr>
+        <a:xfrm>
+          <a:off x="0" y="0"/>
+          <a:ext cx="0" cy="0"/>
+          <a:chOff x="0" y="0"/>
+          <a:chExt cx="0" cy="0"/>
+        </a:xfrm>
+      </p:grpSpPr>
+      <p:sp>
+        <p:nvSpPr>
+          <p:cNvPr id="74" name="Shape 74"/>
+          <p:cNvSpPr txBox="1">
+            <a:spLocks noGrp="1"/>
+          </p:cNvSpPr>
+          <p:nvPr>
+            <p:ph type="body" idx="1"/>
+          </p:nvPr>
+        </p:nvSpPr>
+        <p:spPr>
+          <a:prstGeom prst="rect">
+            <a:avLst/>
+          </a:prstGeom>
+        </p:spPr>
+        <p:txBody>
+          <a:bodyPr lIns="91425" tIns="91425" rIns="91425" bIns="91425" anchor="t" anchorCtr="0">
+            <a:noAutofit/>
+          </a:bodyPr>
+          <a:lstStyle/>
+          <a:p>
+            <a:pPr lvl="0" rtl="0">
+              <a:spcBef>
+                <a:spcPts val="0"/>
+              </a:spcBef>
+              <a:buClr>
+                <a:schemeClr val="dk1"/>
+              </a:buClr>
+              <a:buSzPct val="61111"/>
+              <a:buFont typeface="Arial"/>
+              <a:buNone/>
+            </a:pPr>
+            <a:r>
+              <a:rPr lang="en" sz="1800" dirty="0"/>
+              <a:t>100% Project Launch: 2012‐09‐21 </a:t>
+            </a:r>
+          </a:p>
+          <a:p>
+            <a:pPr lvl="0" rtl="0">
+              <a:spcBef>
+                <a:spcPts val="0"/>
+              </a:spcBef>
+              <a:buClr>
+                <a:schemeClr val="dk1"/>
+              </a:buClr>
+              <a:buSzPct val="61111"/>
+              <a:buFont typeface="Arial"/>
+              <a:buNone/>
+            </a:pPr>
+            <a:r>
+              <a:rPr lang="en" sz="1800" dirty="0"/>
+              <a:t>100% Requirements Analysis / SRR: 2014‐10‐17</a:t>
+            </a:r>
+          </a:p>
+          <a:p>
+            <a:pPr lvl="0" rtl="0">
+              <a:spcBef>
+                <a:spcPts val="0"/>
+              </a:spcBef>
+              <a:buClr>
+                <a:schemeClr val="dk1"/>
+              </a:buClr>
+              <a:buSzPct val="61111"/>
+              <a:buFont typeface="Arial"/>
+              <a:buNone/>
+            </a:pPr>
+            <a:r>
+              <a:rPr lang="en" sz="1800" dirty="0"/>
+              <a:t>100% System Design / SDR: 2014‐10‐31</a:t>
+            </a:r>
+          </a:p>
+          <a:p>
+            <a:pPr lvl="0" rtl="0">
+              <a:spcBef>
+                <a:spcPts val="0"/>
+              </a:spcBef>
+              <a:buClr>
+                <a:schemeClr val="dk1"/>
+              </a:buClr>
+              <a:buSzPct val="61111"/>
+              <a:buFont typeface="Arial"/>
+              <a:buNone/>
+            </a:pPr>
+            <a:r>
+              <a:rPr lang="en" sz="1800" dirty="0" smtClean="0"/>
+              <a:t>90% </a:t>
+            </a:r>
+            <a:r>
+              <a:rPr lang="en" sz="1800" dirty="0"/>
+              <a:t>Architectural Design / PDR: 2014‐11‐14</a:t>
+            </a:r>
+          </a:p>
+          <a:p>
+            <a:pPr lvl="0" rtl="0">
+              <a:spcBef>
+                <a:spcPts val="0"/>
+              </a:spcBef>
+              <a:buClr>
+                <a:schemeClr val="dk1"/>
+              </a:buClr>
+              <a:buSzPct val="61111"/>
+              <a:buFont typeface="Arial"/>
+              <a:buNone/>
+            </a:pPr>
+            <a:r>
+              <a:rPr lang="en" sz="1800" dirty="0"/>
+              <a:t>0% Detailed Design / CDR: 2014‐12‐05</a:t>
+            </a:r>
+          </a:p>
+          <a:p>
+            <a:pPr lvl="0" rtl="0">
+              <a:spcBef>
+                <a:spcPts val="0"/>
+              </a:spcBef>
+              <a:buNone/>
+            </a:pPr>
+            <a:r>
+              <a:rPr lang="en" sz="1800" dirty="0"/>
+              <a:t>0% Interim Presentation: </a:t>
+            </a:r>
+            <a:r>
+              <a:rPr lang="en" sz="1800" dirty="0" smtClean="0"/>
+              <a:t>2014‐12‐12</a:t>
+            </a:r>
+            <a:endParaRPr lang="en" sz="1800" dirty="0"/>
+          </a:p>
+        </p:txBody>
+      </p:sp>
+      <p:sp>
+        <p:nvSpPr>
+          <p:cNvPr id="75" name="Shape 75"/>
+          <p:cNvSpPr txBox="1">
+            <a:spLocks noGrp="1"/>
+          </p:cNvSpPr>
+          <p:nvPr>
+            <p:ph type="title"/>
+          </p:nvPr>
+        </p:nvSpPr>
+        <p:spPr>
+          <a:prstGeom prst="rect">
+            <a:avLst/>
+          </a:prstGeom>
+        </p:spPr>
+        <p:txBody>
+          <a:bodyPr lIns="91425" tIns="91425" rIns="91425" bIns="91425" anchor="b" anchorCtr="0">
+            <a:noAutofit/>
+          </a:bodyPr>
+          <a:lstStyle/>
+          <a:p>
+            <a:pPr algn="ctr" rtl="0">
+              <a:spcBef>
+                <a:spcPts val="0"/>
+              </a:spcBef>
+              <a:buNone/>
+            </a:pPr>
+            <a:r>
+              <a:rPr lang="en" sz="2400"/>
+              <a:t>WCP52 USB Gain/Phase Analyzer</a:t>
+            </a:r>
+          </a:p>
+          <a:p>
+            <a:pPr algn="ctr">
+              <a:spcBef>
+                <a:spcPts val="0"/>
+              </a:spcBef>
+              <a:buNone/>
+            </a:pPr>
+            <a:r>
+              <a:rPr lang="en" sz="2400"/>
+              <a:t>Major Milestones Fall</a:t>
+            </a:r>
+          </a:p>
+        </p:txBody>
+      </p:sp>
+      <p:sp>
+        <p:nvSpPr>
+          <p:cNvPr id="2" name="Date Placeholder 1"/>
+          <p:cNvSpPr>
+            <a:spLocks noGrp="1"/>
+          </p:cNvSpPr>
+          <p:nvPr>
+            <p:ph type="dt" sz="half" idx="11"/>
+          </p:nvPr>
+        </p:nvSpPr>
+        <p:spPr/>
+        <p:txBody>
+          <a:bodyPr/>
+          <a:lstStyle/>
+          <a:p>
+            <a:r>
+              <a:rPr lang="en-US" smtClean="0"/>
+              <a:t>2014-11-07</a:t>
+            </a:r>
+            <a:endParaRPr lang="en-US"/>
+          </a:p>
+        </p:txBody>
+      </p:sp>
+      <p:sp>
+        <p:nvSpPr>
+          <p:cNvPr id="3" name="Slide Number Placeholder 2"/>
+          <p:cNvSpPr>
+            <a:spLocks noGrp="1"/>
+          </p:cNvSpPr>
+          <p:nvPr>
+            <p:ph type="sldNum" sz="quarter" idx="12"/>
+          </p:nvPr>
+        </p:nvSpPr>
+        <p:spPr/>
+        <p:txBody>
+          <a:bodyPr/>
+          <a:lstStyle/>
+          <a:p>
+            <a:fld id="{4BA79C76-1B6A-4E37-9B85-8606EC8655A7}" type="slidenum">
+              <a:rPr lang="en-US" smtClean="0"/>
+              <a:t>10</a:t>
+            </a:fld>
+            <a:endParaRPr lang="en-US"/>
+          </a:p>
+        </p:txBody>
+      </p:sp>
+    </p:spTree>
+  </p:cSld>
+  <p:clrMapOvr>
+    <a:masterClrMapping/>
+  </p:clrMapOvr>
+  <p:transition spd="slow">
+    <p:cut/>
+  </p:transition>
+</p:sld>
+</file>
+
+<file path=ppt/slides/slide11.xml><?xml version="1.0" encoding="utf-8"?>
+<p:sld xmlns:a="http://schemas.openxmlformats.org/drawingml/2006/main" xmlns:r="http://schemas.openxmlformats.org/officeDocument/2006/relationships" xmlns:p="http://schemas.openxmlformats.org/presentationml/2006/main">
+  <p:cSld>
+    <p:spTree>
+      <p:nvGrpSpPr>
+        <p:cNvPr id="1" name="Shape 79"/>
+        <p:cNvGrpSpPr/>
+        <p:nvPr/>
+      </p:nvGrpSpPr>
+      <p:grpSpPr>
+        <a:xfrm>
+          <a:off x="0" y="0"/>
+          <a:ext cx="0" cy="0"/>
+          <a:chOff x="0" y="0"/>
+          <a:chExt cx="0" cy="0"/>
+        </a:xfrm>
+      </p:grpSpPr>
+      <p:sp>
+        <p:nvSpPr>
+          <p:cNvPr id="81" name="Shape 81"/>
+          <p:cNvSpPr txBox="1">
+            <a:spLocks noGrp="1"/>
+          </p:cNvSpPr>
+          <p:nvPr>
+            <p:ph type="title"/>
+          </p:nvPr>
+        </p:nvSpPr>
+        <p:spPr>
+          <a:prstGeom prst="rect">
+            <a:avLst/>
+          </a:prstGeom>
+        </p:spPr>
+        <p:txBody>
+          <a:bodyPr lIns="91425" tIns="91425" rIns="91425" bIns="91425" anchor="b" anchorCtr="0">
+            <a:noAutofit/>
+          </a:bodyPr>
+          <a:lstStyle/>
+          <a:p>
+            <a:pPr algn="ctr" rtl="0">
+              <a:spcBef>
+                <a:spcPts val="0"/>
+              </a:spcBef>
+              <a:buNone/>
+            </a:pPr>
+            <a:r>
+              <a:rPr lang="en" sz="2400"/>
+              <a:t>WCP52 USB Gain/Phase Analyzer</a:t>
+            </a:r>
+          </a:p>
+          <a:p>
+            <a:pPr algn="ctr">
+              <a:spcBef>
+                <a:spcPts val="0"/>
+              </a:spcBef>
+              <a:buNone/>
+            </a:pPr>
+            <a:r>
+              <a:rPr lang="en" sz="2400"/>
+              <a:t>Project Finances: 500$</a:t>
+            </a:r>
+          </a:p>
+        </p:txBody>
+      </p:sp>
+      <p:pic>
+        <p:nvPicPr>
+          <p:cNvPr id="82" name="Shape 82"/>
+          <p:cNvPicPr preferRelativeResize="0"/>
+          <p:nvPr/>
+        </p:nvPicPr>
+        <p:blipFill>
+          <a:blip r:embed="rId3">
+            <a:alphaModFix/>
+          </a:blip>
+          <a:stretch>
+            <a:fillRect/>
+          </a:stretch>
+        </p:blipFill>
+        <p:spPr>
+          <a:xfrm>
+            <a:off x="1804987" y="1200174"/>
+            <a:ext cx="5534025" cy="3422699"/>
+          </a:xfrm>
+          <a:prstGeom prst="rect">
+            <a:avLst/>
+          </a:prstGeom>
+          <a:noFill/>
+          <a:ln>
+            <a:noFill/>
+          </a:ln>
+        </p:spPr>
+      </p:pic>
+      <p:sp>
+        <p:nvSpPr>
+          <p:cNvPr id="4" name="Date Placeholder 3"/>
+          <p:cNvSpPr>
+            <a:spLocks noGrp="1"/>
+          </p:cNvSpPr>
+          <p:nvPr>
+            <p:ph type="dt" sz="half" idx="11"/>
+          </p:nvPr>
+        </p:nvSpPr>
+        <p:spPr/>
+        <p:txBody>
+          <a:bodyPr/>
+          <a:lstStyle/>
+          <a:p>
+            <a:r>
+              <a:rPr lang="en-US" smtClean="0"/>
+              <a:t>2014-11-07</a:t>
+            </a:r>
+            <a:endParaRPr lang="en-US"/>
+          </a:p>
+        </p:txBody>
+      </p:sp>
+      <p:sp>
+        <p:nvSpPr>
+          <p:cNvPr id="5" name="Slide Number Placeholder 4"/>
+          <p:cNvSpPr>
+            <a:spLocks noGrp="1"/>
+          </p:cNvSpPr>
+          <p:nvPr>
+            <p:ph type="sldNum" sz="quarter" idx="12"/>
+          </p:nvPr>
+        </p:nvSpPr>
+        <p:spPr/>
+        <p:txBody>
+          <a:bodyPr/>
+          <a:lstStyle/>
+          <a:p>
+            <a:fld id="{4BA79C76-1B6A-4E37-9B85-8606EC8655A7}" type="slidenum">
+              <a:rPr lang="en-US" smtClean="0"/>
+              <a:t>11</a:t>
+            </a:fld>
+            <a:endParaRPr lang="en-US"/>
+          </a:p>
+        </p:txBody>
+      </p:sp>
+    </p:spTree>
+  </p:cSld>
+  <p:clrMapOvr>
+    <a:masterClrMapping/>
+  </p:clrMapOvr>
+  <p:transition spd="slow">
+    <p:cut/>
+  </p:transition>
+</p:sld>
+</file>
+
+<file path=ppt/slides/slide12.xml><?xml version="1.0" encoding="utf-8"?>
+<p:sld xmlns:a="http://schemas.openxmlformats.org/drawingml/2006/main" xmlns:r="http://schemas.openxmlformats.org/officeDocument/2006/relationships" xmlns:p="http://schemas.openxmlformats.org/presentationml/2006/main">
+  <p:cSld>
+    <p:spTree>
+      <p:nvGrpSpPr>
+        <p:cNvPr id="1" name="Shape 86"/>
+        <p:cNvGrpSpPr/>
+        <p:nvPr/>
+      </p:nvGrpSpPr>
+      <p:grpSpPr>
+        <a:xfrm>
+          <a:off x="0" y="0"/>
+          <a:ext cx="0" cy="0"/>
+          <a:chOff x="0" y="0"/>
+          <a:chExt cx="0" cy="0"/>
+        </a:xfrm>
+      </p:grpSpPr>
+      <p:sp>
+        <p:nvSpPr>
+          <p:cNvPr id="87" name="Shape 87"/>
+          <p:cNvSpPr txBox="1">
+            <a:spLocks noGrp="1"/>
+          </p:cNvSpPr>
+          <p:nvPr>
+            <p:ph type="body" idx="1"/>
+          </p:nvPr>
+        </p:nvSpPr>
+        <p:spPr>
+          <a:prstGeom prst="rect">
+            <a:avLst/>
+          </a:prstGeom>
+        </p:spPr>
+        <p:txBody>
+          <a:bodyPr lIns="91425" tIns="91425" rIns="91425" bIns="91425" anchor="t" anchorCtr="0">
+            <a:noAutofit/>
+          </a:bodyPr>
+          <a:lstStyle/>
+          <a:p>
+            <a:pPr rtl="0">
+              <a:spcBef>
+                <a:spcPts val="0"/>
+              </a:spcBef>
+              <a:buNone/>
+            </a:pPr>
+            <a:endParaRPr sz="1800" dirty="0"/>
+          </a:p>
+          <a:p>
+            <a:pPr marL="457200" lvl="0" indent="-342900" rtl="0">
+              <a:spcBef>
+                <a:spcPts val="0"/>
+              </a:spcBef>
+              <a:buClr>
+                <a:schemeClr val="dk2"/>
+              </a:buClr>
+              <a:buSzPct val="100000"/>
+              <a:buFont typeface="Trebuchet MS"/>
+              <a:buChar char="●"/>
+            </a:pPr>
+            <a:r>
+              <a:rPr lang="en" sz="1800" dirty="0"/>
+              <a:t>Better understand how to interface with  the ATSAM4S16C </a:t>
+            </a:r>
+            <a:r>
+              <a:rPr lang="en" sz="1800" dirty="0" smtClean="0"/>
+              <a:t>microcontroller</a:t>
+            </a:r>
+            <a:endParaRPr lang="en" sz="1800" dirty="0"/>
+          </a:p>
+        </p:txBody>
+      </p:sp>
+      <p:sp>
+        <p:nvSpPr>
+          <p:cNvPr id="88" name="Shape 88"/>
+          <p:cNvSpPr txBox="1">
+            <a:spLocks noGrp="1"/>
+          </p:cNvSpPr>
+          <p:nvPr>
+            <p:ph type="title"/>
+          </p:nvPr>
+        </p:nvSpPr>
+        <p:spPr>
+          <a:prstGeom prst="rect">
+            <a:avLst/>
+          </a:prstGeom>
+        </p:spPr>
+        <p:txBody>
+          <a:bodyPr lIns="91425" tIns="91425" rIns="91425" bIns="91425" anchor="b" anchorCtr="0">
+            <a:noAutofit/>
+          </a:bodyPr>
+          <a:lstStyle/>
+          <a:p>
+            <a:pPr algn="ctr" rtl="0">
+              <a:spcBef>
+                <a:spcPts val="0"/>
+              </a:spcBef>
+              <a:buNone/>
+            </a:pPr>
+            <a:r>
+              <a:rPr lang="en" sz="2400"/>
+              <a:t>WCP52 USB Gain/Phase Analyzer</a:t>
+            </a:r>
+          </a:p>
+          <a:p>
+            <a:pPr algn="ctr">
+              <a:spcBef>
+                <a:spcPts val="0"/>
+              </a:spcBef>
+              <a:buNone/>
+            </a:pPr>
+            <a:r>
+              <a:rPr lang="en" sz="2400"/>
+              <a:t>Major Issues</a:t>
+            </a:r>
+          </a:p>
+        </p:txBody>
+      </p:sp>
+      <p:sp>
+        <p:nvSpPr>
+          <p:cNvPr id="2" name="Date Placeholder 1"/>
+          <p:cNvSpPr>
+            <a:spLocks noGrp="1"/>
+          </p:cNvSpPr>
+          <p:nvPr>
+            <p:ph type="dt" sz="half" idx="11"/>
+          </p:nvPr>
+        </p:nvSpPr>
+        <p:spPr/>
+        <p:txBody>
+          <a:bodyPr/>
+          <a:lstStyle/>
+          <a:p>
+            <a:r>
+              <a:rPr lang="en-US" smtClean="0"/>
+              <a:t>2014-11-07</a:t>
+            </a:r>
+            <a:endParaRPr lang="en-US"/>
+          </a:p>
+        </p:txBody>
+      </p:sp>
+      <p:sp>
+        <p:nvSpPr>
+          <p:cNvPr id="3" name="Slide Number Placeholder 2"/>
+          <p:cNvSpPr>
+            <a:spLocks noGrp="1"/>
+          </p:cNvSpPr>
+          <p:nvPr>
+            <p:ph type="sldNum" sz="quarter" idx="12"/>
+          </p:nvPr>
+        </p:nvSpPr>
+        <p:spPr/>
+        <p:txBody>
+          <a:bodyPr/>
+          <a:lstStyle/>
+          <a:p>
+            <a:fld id="{4BA79C76-1B6A-4E37-9B85-8606EC8655A7}" type="slidenum">
+              <a:rPr lang="en-US" smtClean="0"/>
+              <a:t>12</a:t>
+            </a:fld>
+            <a:endParaRPr lang="en-US"/>
+          </a:p>
+        </p:txBody>
+      </p:sp>
+    </p:spTree>
+  </p:cSld>
+  <p:clrMapOvr>
+    <a:masterClrMapping/>
+  </p:clrMapOvr>
+  <p:transition spd="slow">
+    <p:cut/>
+  </p:transition>
+</p:sld>
+</file>
+
 <file path=ppt/slides/slide2.xml><?xml version="1.0" encoding="utf-8"?>
 <p:sld xmlns:a="http://schemas.openxmlformats.org/drawingml/2006/main" xmlns:r="http://schemas.openxmlformats.org/officeDocument/2006/relationships" xmlns:p="http://schemas.openxmlformats.org/presentationml/2006/main">
   <p:cSld>
@@ -6281,15 +7201,67 @@
           </a:p>
         </p:txBody>
       </p:sp>
+      <p:sp>
+        <p:nvSpPr>
+          <p:cNvPr id="3" name="Date Placeholder 2"/>
+          <p:cNvSpPr>
+            <a:spLocks noGrp="1"/>
+          </p:cNvSpPr>
+          <p:nvPr>
+            <p:ph type="dt" sz="half" idx="11"/>
+          </p:nvPr>
+        </p:nvSpPr>
+        <p:spPr/>
+        <p:txBody>
+          <a:bodyPr/>
+          <a:lstStyle/>
+          <a:p>
+            <a:r>
+              <a:rPr lang="en-US" smtClean="0"/>
+              <a:t>2014-11-07</a:t>
+            </a:r>
+            <a:endParaRPr lang="en-US"/>
+          </a:p>
+        </p:txBody>
+      </p:sp>
+      <p:sp>
+        <p:nvSpPr>
+          <p:cNvPr id="4" name="Slide Number Placeholder 3"/>
+          <p:cNvSpPr>
+            <a:spLocks noGrp="1"/>
+          </p:cNvSpPr>
+          <p:nvPr>
+            <p:ph type="sldNum" sz="quarter" idx="12"/>
+          </p:nvPr>
+        </p:nvSpPr>
+        <p:spPr/>
+        <p:txBody>
+          <a:bodyPr/>
+          <a:lstStyle/>
+          <a:p>
+            <a:fld id="{4BA79C76-1B6A-4E37-9B85-8606EC8655A7}" type="slidenum">
+              <a:rPr lang="en-US" smtClean="0"/>
+              <a:t>5</a:t>
+            </a:fld>
+            <a:endParaRPr lang="en-US"/>
+          </a:p>
+        </p:txBody>
+      </p:sp>
       <p:pic>
         <p:nvPicPr>
-          <p:cNvPr id="69" name="Shape 69"/>
-          <p:cNvPicPr preferRelativeResize="0"/>
+          <p:cNvPr id="2" name="Picture 1"/>
+          <p:cNvPicPr>
+            <a:picLocks noChangeAspect="1"/>
+          </p:cNvPicPr>
           <p:nvPr/>
         </p:nvPicPr>
         <p:blipFill>
           <a:blip r:embed="rId3">
-            <a:alphaModFix/>
+            <a:extLst>
+              <a:ext uri="{28A0092B-C50C-407E-A947-70E740481C1C}">
+                <a14:useLocalDpi xmlns:a14="http://schemas.microsoft.com/office/drawing/2010/main" val="0"/>
+              </a:ext>
+            </a:extLst>
           </a:blip>
           <a:stretch>
             <a:fillRect/>
@@ -6297,64 +7269,14 @@
         </p:blipFill>
         <p:spPr>
           <a:xfrm>
-            <a:off x="2025862" y="1244250"/>
-            <a:ext cx="5092274" cy="3197950"/>
+            <a:off x="2895598" y="1230824"/>
+            <a:ext cx="3352804" cy="3434762"/>
           </a:xfrm>
           <a:prstGeom prst="rect">
             <a:avLst/>
           </a:prstGeom>
-          <a:noFill/>
-          <a:ln>
-            <a:noFill/>
-          </a:ln>
         </p:spPr>
       </p:pic>
-      <p:sp>
-        <p:nvSpPr>
-          <p:cNvPr id="3" name="Date Placeholder 2"/>
-          <p:cNvSpPr>
-            <a:spLocks noGrp="1"/>
-          </p:cNvSpPr>
-          <p:nvPr>
-            <p:ph type="dt" sz="half" idx="11"/>
-          </p:nvPr>
-        </p:nvSpPr>
-        <p:spPr/>
-        <p:txBody>
-          <a:bodyPr/>
-          <a:lstStyle/>
-          <a:p>
-            <a:r>
-              <a:rPr lang="en-US" smtClean="0"/>
-              <a:t>2014-11-07</a:t>
-            </a:r>
-            <a:endParaRPr lang="en-US"/>
-          </a:p>
-        </p:txBody>
-      </p:sp>
-      <p:sp>
-        <p:nvSpPr>
-          <p:cNvPr id="4" name="Slide Number Placeholder 3"/>
-          <p:cNvSpPr>
-            <a:spLocks noGrp="1"/>
-          </p:cNvSpPr>
-          <p:nvPr>
-            <p:ph type="sldNum" sz="quarter" idx="12"/>
-          </p:nvPr>
-        </p:nvSpPr>
-        <p:spPr/>
-        <p:txBody>
-          <a:bodyPr/>
-          <a:lstStyle/>
-          <a:p>
-            <a:fld id="{4BA79C76-1B6A-4E37-9B85-8606EC8655A7}" type="slidenum">
-              <a:rPr lang="en-US" smtClean="0"/>
-              <a:t>5</a:t>
-            </a:fld>
-            <a:endParaRPr lang="en-US"/>
-          </a:p>
-        </p:txBody>
-      </p:sp>
     </p:spTree>
   </p:cSld>
   <p:clrMapOvr>
@@ -6516,7 +7438,7 @@
   <p:cSld>
     <p:spTree>
       <p:nvGrpSpPr>
-        <p:cNvPr id="1" name="Shape 73"/>
+        <p:cNvPr id="1" name="Shape 53"/>
         <p:cNvGrpSpPr/>
         <p:nvPr/>
       </p:nvGrpSpPr>
@@ -6530,12 +7452,31 @@
       </p:grpSpPr>
       <p:sp>
         <p:nvSpPr>
-          <p:cNvPr id="74" name="Shape 74"/>
+          <p:cNvPr id="2" name="Text Placeholder 1"/>
+          <p:cNvSpPr>
+            <a:spLocks noGrp="1"/>
+          </p:cNvSpPr>
+          <p:nvPr>
+            <p:ph type="body" idx="1"/>
+          </p:nvPr>
+        </p:nvSpPr>
+        <p:spPr/>
+        <p:txBody>
+          <a:bodyPr/>
+          <a:lstStyle/>
+          <a:p>
+            <a:endParaRPr lang="en-US"/>
+          </a:p>
+        </p:txBody>
+      </p:sp>
+      <p:sp>
+        <p:nvSpPr>
+          <p:cNvPr id="55" name="Shape 55"/>
           <p:cNvSpPr txBox="1">
             <a:spLocks noGrp="1"/>
           </p:cNvSpPr>
           <p:nvPr>
-            <p:ph type="body" idx="1"/>
+            <p:ph type="title"/>
           </p:nvPr>
         </p:nvSpPr>
         <p:spPr>
@@ -6544,167 +7485,40 @@
           </a:prstGeom>
         </p:spPr>
         <p:txBody>
-          <a:bodyPr lIns="91425" tIns="91425" rIns="91425" bIns="91425" anchor="t" anchorCtr="0">
+          <a:bodyPr lIns="91425" tIns="91425" rIns="91425" bIns="91425" anchor="b" anchorCtr="0">
             <a:noAutofit/>
           </a:bodyPr>
           <a:lstStyle/>
           <a:p>
-            <a:pPr lvl="0" rtl="0">
-              <a:spcBef>
-                <a:spcPts val="0"/>
-              </a:spcBef>
-              <a:buClr>
-                <a:schemeClr val="dk1"/>
-              </a:buClr>
-              <a:buSzPct val="61111"/>
-              <a:buFont typeface="Arial"/>
+            <a:pPr algn="ctr" rtl="0">
+              <a:spcBef>
+                <a:spcPts val="0"/>
+              </a:spcBef>
               <a:buNone/>
             </a:pPr>
             <a:r>
-              <a:rPr lang="en" sz="1800" dirty="0"/>
-              <a:t>100% Project Launch: 2012‐09‐21 </a:t>
+              <a:rPr lang="en" sz="2400" dirty="0"/>
+              <a:t>WCP52 USB Gain/Phase Analyzer</a:t>
             </a:r>
           </a:p>
           <a:p>
-            <a:pPr lvl="0" rtl="0">
-              <a:spcBef>
-                <a:spcPts val="0"/>
-              </a:spcBef>
-              <a:buClr>
-                <a:schemeClr val="dk1"/>
-              </a:buClr>
-              <a:buSzPct val="61111"/>
-              <a:buFont typeface="Arial"/>
+            <a:pPr algn="ctr">
+              <a:spcBef>
+                <a:spcPts val="0"/>
+              </a:spcBef>
               <a:buNone/>
             </a:pPr>
             <a:r>
-              <a:rPr lang="en" sz="1800" dirty="0"/>
-              <a:t>100% Requirements Analysis / SRR: 2014‐10‐17</a:t>
+              <a:rPr lang="en" sz="2400" dirty="0" smtClean="0"/>
+              <a:t>Meeting Requirements</a:t>
             </a:r>
-          </a:p>
-          <a:p>
-            <a:pPr lvl="0" rtl="0">
-              <a:spcBef>
-                <a:spcPts val="0"/>
-              </a:spcBef>
-              <a:buClr>
-                <a:schemeClr val="dk1"/>
-              </a:buClr>
-              <a:buSzPct val="61111"/>
-              <a:buFont typeface="Arial"/>
-              <a:buNone/>
-            </a:pPr>
-            <a:r>
-              <a:rPr lang="en" sz="1800" dirty="0"/>
-              <a:t>100% System Design / SDR: 2014‐10‐31</a:t>
-            </a:r>
-          </a:p>
-          <a:p>
-            <a:pPr lvl="0" rtl="0">
-              <a:spcBef>
-                <a:spcPts val="0"/>
-              </a:spcBef>
-              <a:buClr>
-                <a:schemeClr val="dk1"/>
-              </a:buClr>
-              <a:buSzPct val="61111"/>
-              <a:buFont typeface="Arial"/>
-              <a:buNone/>
-            </a:pPr>
-            <a:r>
-              <a:rPr lang="en" sz="1800" dirty="0" smtClean="0"/>
-              <a:t>90% </a:t>
-            </a:r>
-            <a:r>
-              <a:rPr lang="en" sz="1800" dirty="0"/>
-              <a:t>Architectural Design / PDR: 2014‐11‐14</a:t>
-            </a:r>
-          </a:p>
-          <a:p>
-            <a:pPr lvl="0" rtl="0">
-              <a:spcBef>
-                <a:spcPts val="0"/>
-              </a:spcBef>
-              <a:buClr>
-                <a:schemeClr val="dk1"/>
-              </a:buClr>
-              <a:buSzPct val="61111"/>
-              <a:buFont typeface="Arial"/>
-              <a:buNone/>
-            </a:pPr>
-            <a:r>
-              <a:rPr lang="en" sz="1800" dirty="0"/>
-              <a:t>0% Detailed Design / CDR: 2014‐12‐05</a:t>
-            </a:r>
-          </a:p>
-          <a:p>
-            <a:pPr lvl="0" rtl="0">
-              <a:spcBef>
-                <a:spcPts val="0"/>
-              </a:spcBef>
-              <a:buNone/>
-            </a:pPr>
-            <a:r>
-              <a:rPr lang="en" sz="1800" dirty="0"/>
-              <a:t>0% Interim Presentation: </a:t>
-            </a:r>
-            <a:r>
-              <a:rPr lang="en" sz="1800" dirty="0" smtClean="0"/>
-              <a:t>2014‐12‐12</a:t>
-            </a:r>
-            <a:endParaRPr lang="en" sz="1800" dirty="0"/>
-          </a:p>
-        </p:txBody>
-      </p:sp>
-      <p:sp>
-        <p:nvSpPr>
-          <p:cNvPr id="75" name="Shape 75"/>
-          <p:cNvSpPr txBox="1">
-            <a:spLocks noGrp="1"/>
-          </p:cNvSpPr>
-          <p:nvPr>
-            <p:ph type="title"/>
-          </p:nvPr>
-        </p:nvSpPr>
-        <p:spPr>
-          <a:prstGeom prst="rect">
-            <a:avLst/>
-          </a:prstGeom>
-        </p:spPr>
-        <p:txBody>
-          <a:bodyPr lIns="91425" tIns="91425" rIns="91425" bIns="91425" anchor="b" anchorCtr="0">
-            <a:noAutofit/>
-          </a:bodyPr>
-          <a:lstStyle/>
-          <a:p>
-            <a:pPr algn="ctr" rtl="0">
-              <a:spcBef>
-                <a:spcPts val="0"/>
-              </a:spcBef>
-              <a:buNone/>
-            </a:pPr>
-            <a:r>
-              <a:rPr lang="en" sz="2400"/>
-              <a:t>WCP52 USB Gain/Phase Analyzer</a:t>
-            </a:r>
-          </a:p>
-          <a:p>
-            <a:pPr algn="ctr">
-              <a:spcBef>
-                <a:spcPts val="0"/>
-              </a:spcBef>
-              <a:buNone/>
-            </a:pPr>
-            <a:r>
-              <a:rPr lang="en" sz="2400"/>
-              <a:t>Major Milestones Fall</a:t>
-            </a:r>
-          </a:p>
-        </p:txBody>
-      </p:sp>
-      <p:sp>
-        <p:nvSpPr>
-          <p:cNvPr id="2" name="Date Placeholder 1"/>
+            <a:endParaRPr lang="en" sz="2400" dirty="0"/>
+          </a:p>
+        </p:txBody>
+      </p:sp>
+      <p:sp>
+        <p:nvSpPr>
+          <p:cNvPr id="3" name="Date Placeholder 2"/>
           <p:cNvSpPr>
             <a:spLocks noGrp="1"/>
           </p:cNvSpPr>
@@ -6727,7 +7541,7 @@
       </p:sp>
       <p:sp>
         <p:nvSpPr>
-          <p:cNvPr id="3" name="Slide Number Placeholder 2"/>
+          <p:cNvPr id="4" name="Slide Number Placeholder 3"/>
           <p:cNvSpPr>
             <a:spLocks noGrp="1"/>
           </p:cNvSpPr>
@@ -6749,6 +7563,11 @@
         </p:txBody>
       </p:sp>
     </p:spTree>
+    <p:extLst>
+      <p:ext uri="{BB962C8B-B14F-4D97-AF65-F5344CB8AC3E}">
+        <p14:creationId xmlns:p14="http://schemas.microsoft.com/office/powerpoint/2010/main" val="3030918607"/>
+      </p:ext>
+    </p:extLst>
   </p:cSld>
   <p:clrMapOvr>
     <a:masterClrMapping/>
@@ -6764,7 +7583,7 @@
   <p:cSld>
     <p:spTree>
       <p:nvGrpSpPr>
-        <p:cNvPr id="1" name="Shape 79"/>
+        <p:cNvPr id="1" name="Shape 53"/>
         <p:cNvGrpSpPr/>
         <p:nvPr/>
       </p:nvGrpSpPr>
@@ -6778,7 +7597,30 @@
       </p:grpSpPr>
       <p:sp>
         <p:nvSpPr>
-          <p:cNvPr id="81" name="Shape 81"/>
+          <p:cNvPr id="2" name="Text Placeholder 1"/>
+          <p:cNvSpPr>
+            <a:spLocks noGrp="1"/>
+          </p:cNvSpPr>
+          <p:nvPr>
+            <p:ph type="body" idx="1"/>
+          </p:nvPr>
+        </p:nvSpPr>
+        <p:spPr/>
+        <p:txBody>
+          <a:bodyPr/>
+          <a:lstStyle/>
+          <a:p>
+            <a:r>
+              <a:rPr lang="en-US" dirty="0" smtClean="0"/>
+              <a:t>The entire system consists of a single Printed Circuit Board, assembled with typical SMT assembly techniques, and inserted into a premade enclosure. All parts are easily available.</a:t>
+            </a:r>
+            <a:endParaRPr lang="en-US" dirty="0"/>
+          </a:p>
+        </p:txBody>
+      </p:sp>
+      <p:sp>
+        <p:nvSpPr>
+          <p:cNvPr id="55" name="Shape 55"/>
           <p:cNvSpPr txBox="1">
             <a:spLocks noGrp="1"/>
           </p:cNvSpPr>
@@ -6804,7 +7646,7 @@
               <a:buNone/>
             </a:pPr>
             <a:r>
-              <a:rPr lang="en" sz="2400"/>
+              <a:rPr lang="en" sz="2400" dirty="0"/>
               <a:t>WCP52 USB Gain/Phase Analyzer</a:t>
             </a:r>
           </a:p>
@@ -6816,43 +7658,16 @@
               <a:buNone/>
             </a:pPr>
             <a:r>
-              <a:rPr lang="en" sz="2400"/>
-              <a:t>Project Finances: 500$</a:t>
+              <a:rPr lang="en" sz="2400" dirty="0" smtClean="0"/>
+              <a:t>Manufacturing Feasibility</a:t>
             </a:r>
-          </a:p>
-        </p:txBody>
-      </p:sp>
-      <p:pic>
-        <p:nvPicPr>
-          <p:cNvPr id="82" name="Shape 82"/>
-          <p:cNvPicPr preferRelativeResize="0"/>
-          <p:nvPr/>
-        </p:nvPicPr>
-        <p:blipFill>
-          <a:blip r:embed="rId3">
-            <a:alphaModFix/>
-          </a:blip>
-          <a:stretch>
-            <a:fillRect/>
-          </a:stretch>
-        </p:blipFill>
-        <p:spPr>
-          <a:xfrm>
-            <a:off x="1804987" y="1200174"/>
-            <a:ext cx="5534025" cy="3422699"/>
-          </a:xfrm>
-          <a:prstGeom prst="rect">
-            <a:avLst/>
-          </a:prstGeom>
-          <a:noFill/>
-          <a:ln>
-            <a:noFill/>
-          </a:ln>
-        </p:spPr>
-      </p:pic>
-      <p:sp>
-        <p:nvSpPr>
-          <p:cNvPr id="4" name="Date Placeholder 3"/>
+            <a:endParaRPr lang="en" sz="2400" dirty="0"/>
+          </a:p>
+        </p:txBody>
+      </p:sp>
+      <p:sp>
+        <p:nvSpPr>
+          <p:cNvPr id="3" name="Date Placeholder 2"/>
           <p:cNvSpPr>
             <a:spLocks noGrp="1"/>
           </p:cNvSpPr>
@@ -6875,7 +7690,7 @@
       </p:sp>
       <p:sp>
         <p:nvSpPr>
-          <p:cNvPr id="5" name="Slide Number Placeholder 4"/>
+          <p:cNvPr id="4" name="Slide Number Placeholder 3"/>
           <p:cNvSpPr>
             <a:spLocks noGrp="1"/>
           </p:cNvSpPr>
@@ -6897,6 +7712,11 @@
         </p:txBody>
       </p:sp>
     </p:spTree>
+    <p:extLst>
+      <p:ext uri="{BB962C8B-B14F-4D97-AF65-F5344CB8AC3E}">
+        <p14:creationId xmlns:p14="http://schemas.microsoft.com/office/powerpoint/2010/main" val="245221317"/>
+      </p:ext>
+    </p:extLst>
   </p:cSld>
   <p:clrMapOvr>
     <a:masterClrMapping/>
@@ -6912,7 +7732,7 @@
   <p:cSld>
     <p:spTree>
       <p:nvGrpSpPr>
-        <p:cNvPr id="1" name="Shape 86"/>
+        <p:cNvPr id="1" name="Shape 53"/>
         <p:cNvGrpSpPr/>
         <p:nvPr/>
       </p:nvGrpSpPr>
@@ -6926,12 +7746,45 @@
       </p:grpSpPr>
       <p:sp>
         <p:nvSpPr>
-          <p:cNvPr id="87" name="Shape 87"/>
+          <p:cNvPr id="2" name="Text Placeholder 1"/>
+          <p:cNvSpPr>
+            <a:spLocks noGrp="1"/>
+          </p:cNvSpPr>
+          <p:nvPr>
+            <p:ph type="body" idx="1"/>
+          </p:nvPr>
+        </p:nvSpPr>
+        <p:spPr/>
+        <p:txBody>
+          <a:bodyPr/>
+          <a:lstStyle/>
+          <a:p>
+            <a:r>
+              <a:rPr lang="en-US" dirty="0" smtClean="0"/>
+              <a:t>Schedule:</a:t>
+            </a:r>
+          </a:p>
+          <a:p>
+            <a:pPr marL="457200" indent="-457200">
+              <a:buFont typeface="Arial" panose="020B0604020202020204" pitchFamily="34" charset="0"/>
+              <a:buChar char="•"/>
+            </a:pPr>
+            <a:r>
+              <a:rPr lang="en-US" dirty="0" smtClean="0"/>
+              <a:t>PCBs slow to manufacture. Subsystems are developed in parallel; development can continue while waiting.</a:t>
+            </a:r>
+            <a:endParaRPr lang="en-US" dirty="0"/>
+          </a:p>
+        </p:txBody>
+      </p:sp>
+      <p:sp>
+        <p:nvSpPr>
+          <p:cNvPr id="55" name="Shape 55"/>
           <p:cNvSpPr txBox="1">
             <a:spLocks noGrp="1"/>
           </p:cNvSpPr>
           <p:nvPr>
-            <p:ph type="body" idx="1"/>
+            <p:ph type="title"/>
           </p:nvPr>
         </p:nvSpPr>
         <p:spPr>
@@ -6940,59 +7793,6 @@
           </a:prstGeom>
         </p:spPr>
         <p:txBody>
-          <a:bodyPr lIns="91425" tIns="91425" rIns="91425" bIns="91425" anchor="t" anchorCtr="0">
-            <a:noAutofit/>
-          </a:bodyPr>
-          <a:lstStyle/>
-          <a:p>
-            <a:pPr rtl="0">
-              <a:spcBef>
-                <a:spcPts val="0"/>
-              </a:spcBef>
-              <a:buNone/>
-            </a:pPr>
-            <a:endParaRPr sz="1800" dirty="0"/>
-          </a:p>
-          <a:p>
-            <a:pPr marL="457200" lvl="0" indent="-342900" rtl="0">
-              <a:spcBef>
-                <a:spcPts val="0"/>
-              </a:spcBef>
-              <a:buClr>
-                <a:schemeClr val="dk2"/>
-              </a:buClr>
-              <a:buSzPct val="100000"/>
-              <a:buFont typeface="Trebuchet MS"/>
-              <a:buChar char="●"/>
-            </a:pPr>
-            <a:r>
-              <a:rPr lang="en" sz="1800" dirty="0"/>
-              <a:t>Better understand how to interface with  the ATSAM4S16C </a:t>
-            </a:r>
-            <a:r>
-              <a:rPr lang="en" sz="1800" dirty="0" smtClean="0"/>
-              <a:t>microcontroller</a:t>
-            </a:r>
-            <a:endParaRPr lang="en" sz="1800" dirty="0"/>
-          </a:p>
-        </p:txBody>
-      </p:sp>
-      <p:sp>
-        <p:nvSpPr>
-          <p:cNvPr id="88" name="Shape 88"/>
-          <p:cNvSpPr txBox="1">
-            <a:spLocks noGrp="1"/>
-          </p:cNvSpPr>
-          <p:nvPr>
-            <p:ph type="title"/>
-          </p:nvPr>
-        </p:nvSpPr>
-        <p:spPr>
-          <a:prstGeom prst="rect">
-            <a:avLst/>
-          </a:prstGeom>
-        </p:spPr>
-        <p:txBody>
           <a:bodyPr lIns="91425" tIns="91425" rIns="91425" bIns="91425" anchor="b" anchorCtr="0">
             <a:noAutofit/>
           </a:bodyPr>
@@ -7005,7 +7805,7 @@
               <a:buNone/>
             </a:pPr>
             <a:r>
-              <a:rPr lang="en" sz="2400"/>
+              <a:rPr lang="en" sz="2400" dirty="0"/>
               <a:t>WCP52 USB Gain/Phase Analyzer</a:t>
             </a:r>
           </a:p>
@@ -7017,15 +7817,16 @@
               <a:buNone/>
             </a:pPr>
             <a:r>
-              <a:rPr lang="en" sz="2400"/>
-              <a:t>Major Issues</a:t>
+              <a:rPr lang="en" sz="2400" dirty="0" smtClean="0"/>
+              <a:t>Risks</a:t>
             </a:r>
-          </a:p>
-        </p:txBody>
-      </p:sp>
-      <p:sp>
-        <p:nvSpPr>
-          <p:cNvPr id="2" name="Date Placeholder 1"/>
+            <a:endParaRPr lang="en" sz="2400" dirty="0"/>
+          </a:p>
+        </p:txBody>
+      </p:sp>
+      <p:sp>
+        <p:nvSpPr>
+          <p:cNvPr id="3" name="Date Placeholder 2"/>
           <p:cNvSpPr>
             <a:spLocks noGrp="1"/>
           </p:cNvSpPr>
@@ -7048,7 +7849,7 @@
       </p:sp>
       <p:sp>
         <p:nvSpPr>
-          <p:cNvPr id="3" name="Slide Number Placeholder 2"/>
+          <p:cNvPr id="4" name="Slide Number Placeholder 3"/>
           <p:cNvSpPr>
             <a:spLocks noGrp="1"/>
           </p:cNvSpPr>
@@ -7070,6 +7871,11 @@
         </p:txBody>
       </p:sp>
     </p:spTree>
+    <p:extLst>
+      <p:ext uri="{BB962C8B-B14F-4D97-AF65-F5344CB8AC3E}">
+        <p14:creationId xmlns:p14="http://schemas.microsoft.com/office/powerpoint/2010/main" val="3421896640"/>
+      </p:ext>
+    </p:extLst>
   </p:cSld>
   <p:clrMapOvr>
     <a:masterClrMapping/>

</xml_diff>